<commit_message>
Add passing parameter and funcition call
</commit_message>
<xml_diff>
--- a/15_Ch08_PtrReceiver.pptx
+++ b/15_Ch08_PtrReceiver.pptx
@@ -5,14 +5,15 @@
     <p:sldMasterId id="2147483648" r:id="rId1"/>
   </p:sldMasterIdLst>
   <p:notesMasterIdLst>
-    <p:notesMasterId r:id="rId7"/>
+    <p:notesMasterId r:id="rId8"/>
   </p:notesMasterIdLst>
   <p:sldIdLst>
     <p:sldId id="256" r:id="rId2"/>
-    <p:sldId id="266" r:id="rId3"/>
-    <p:sldId id="268" r:id="rId4"/>
-    <p:sldId id="267" r:id="rId5"/>
-    <p:sldId id="259" r:id="rId6"/>
+    <p:sldId id="267" r:id="rId3"/>
+    <p:sldId id="266" r:id="rId4"/>
+    <p:sldId id="268" r:id="rId5"/>
+    <p:sldId id="269" r:id="rId6"/>
+    <p:sldId id="259" r:id="rId7"/>
   </p:sldIdLst>
   <p:sldSz cx="9144000" cy="6858000" type="screen4x3"/>
   <p:notesSz cx="6858000" cy="9144000"/>
@@ -3706,7 +3707,7 @@
                   <a:schemeClr val="tx1"/>
                 </a:solidFill>
               </a:rPr>
-              <a:t>Value Receiver (c car)</a:t>
+              <a:t>Go to: https://golang.org/doc/faq#Pointers</a:t>
             </a:r>
           </a:p>
         </p:txBody>
@@ -3830,6 +3831,346 @@
           <p:cNvPr id="7" name="Picture 6">
             <a:extLst>
               <a:ext uri="{FF2B5EF4-FFF2-40B4-BE49-F238E27FC236}">
+                <a16:creationId xmlns:a16="http://schemas.microsoft.com/office/drawing/2014/main" id="{57ED30F3-48A3-4144-A4BD-51DBD137886C}"/>
+              </a:ext>
+            </a:extLst>
+          </p:cNvPr>
+          <p:cNvPicPr>
+            <a:picLocks noChangeAspect="1"/>
+          </p:cNvPicPr>
+          <p:nvPr/>
+        </p:nvPicPr>
+        <p:blipFill>
+          <a:blip r:embed="rId2"/>
+          <a:stretch>
+            <a:fillRect/>
+          </a:stretch>
+        </p:blipFill>
+        <p:spPr>
+          <a:xfrm>
+            <a:off x="1547664" y="1916834"/>
+            <a:ext cx="5745407" cy="4512915"/>
+          </a:xfrm>
+          <a:prstGeom prst="rect">
+            <a:avLst/>
+          </a:prstGeom>
+          <a:ln>
+            <a:solidFill>
+              <a:srgbClr val="C00000"/>
+            </a:solidFill>
+          </a:ln>
+        </p:spPr>
+      </p:pic>
+      <p:sp>
+        <p:nvSpPr>
+          <p:cNvPr id="8" name="Rectangle 7">
+            <a:extLst>
+              <a:ext uri="{FF2B5EF4-FFF2-40B4-BE49-F238E27FC236}">
+                <a16:creationId xmlns:a16="http://schemas.microsoft.com/office/drawing/2014/main" id="{C6CCAA14-8B49-47E0-9404-C6E0F971FD69}"/>
+              </a:ext>
+            </a:extLst>
+          </p:cNvPr>
+          <p:cNvSpPr/>
+          <p:nvPr/>
+        </p:nvSpPr>
+        <p:spPr>
+          <a:xfrm>
+            <a:off x="1691680" y="5229200"/>
+            <a:ext cx="5112568" cy="373636"/>
+          </a:xfrm>
+          <a:prstGeom prst="rect">
+            <a:avLst/>
+          </a:prstGeom>
+          <a:noFill/>
+          <a:ln>
+            <a:solidFill>
+              <a:srgbClr val="C00000"/>
+            </a:solidFill>
+          </a:ln>
+        </p:spPr>
+        <p:style>
+          <a:lnRef idx="2">
+            <a:schemeClr val="accent1">
+              <a:shade val="50000"/>
+            </a:schemeClr>
+          </a:lnRef>
+          <a:fillRef idx="1">
+            <a:schemeClr val="accent1"/>
+          </a:fillRef>
+          <a:effectRef idx="0">
+            <a:schemeClr val="accent1"/>
+          </a:effectRef>
+          <a:fontRef idx="minor">
+            <a:schemeClr val="lt1"/>
+          </a:fontRef>
+        </p:style>
+        <p:txBody>
+          <a:bodyPr rtlCol="0" anchor="ctr"/>
+          <a:lstStyle/>
+          <a:p>
+            <a:pPr algn="ctr"/>
+            <a:endParaRPr lang="en-US"/>
+          </a:p>
+        </p:txBody>
+      </p:sp>
+    </p:spTree>
+    <p:extLst>
+      <p:ext uri="{BB962C8B-B14F-4D97-AF65-F5344CB8AC3E}">
+        <p14:creationId xmlns:p14="http://schemas.microsoft.com/office/powerpoint/2010/main" val="1316084119"/>
+      </p:ext>
+    </p:extLst>
+  </p:cSld>
+  <p:clrMapOvr>
+    <a:masterClrMapping/>
+  </p:clrMapOvr>
+</p:sld>
+</file>
+
+<file path=ppt/slides/slide3.xml><?xml version="1.0" encoding="utf-8"?>
+<p:sld xmlns:a="http://schemas.openxmlformats.org/drawingml/2006/main" xmlns:r="http://schemas.openxmlformats.org/officeDocument/2006/relationships" xmlns:p="http://schemas.openxmlformats.org/presentationml/2006/main">
+  <p:cSld>
+    <p:spTree>
+      <p:nvGrpSpPr>
+        <p:cNvPr id="1" name=""/>
+        <p:cNvGrpSpPr/>
+        <p:nvPr/>
+      </p:nvGrpSpPr>
+      <p:grpSpPr>
+        <a:xfrm>
+          <a:off x="0" y="0"/>
+          <a:ext cx="0" cy="0"/>
+          <a:chOff x="0" y="0"/>
+          <a:chExt cx="0" cy="0"/>
+        </a:xfrm>
+      </p:grpSpPr>
+      <p:sp>
+        <p:nvSpPr>
+          <p:cNvPr id="2" name="標題 1"/>
+          <p:cNvSpPr>
+            <a:spLocks noGrp="1"/>
+          </p:cNvSpPr>
+          <p:nvPr>
+            <p:ph type="ctrTitle"/>
+          </p:nvPr>
+        </p:nvSpPr>
+        <p:spPr>
+          <a:xfrm>
+            <a:off x="0" y="1"/>
+            <a:ext cx="9144000" cy="764704"/>
+          </a:xfrm>
+          <a:gradFill flip="none" rotWithShape="1">
+            <a:gsLst>
+              <a:gs pos="0">
+                <a:srgbClr val="C00000">
+                  <a:shade val="30000"/>
+                  <a:satMod val="115000"/>
+                </a:srgbClr>
+              </a:gs>
+              <a:gs pos="50000">
+                <a:srgbClr val="C00000">
+                  <a:shade val="67500"/>
+                  <a:satMod val="115000"/>
+                </a:srgbClr>
+              </a:gs>
+              <a:gs pos="100000">
+                <a:srgbClr val="C00000">
+                  <a:shade val="100000"/>
+                  <a:satMod val="115000"/>
+                </a:srgbClr>
+              </a:gs>
+            </a:gsLst>
+            <a:path path="circle">
+              <a:fillToRect t="100000" r="100000"/>
+            </a:path>
+            <a:tileRect l="-100000" b="-100000"/>
+          </a:gradFill>
+        </p:spPr>
+        <p:txBody>
+          <a:bodyPr/>
+          <a:lstStyle/>
+          <a:p>
+            <a:pPr algn="l"/>
+            <a:r>
+              <a:rPr lang="en-US" altLang="zh-TW" b="1" dirty="0">
+                <a:solidFill>
+                  <a:srgbClr val="FFFF00"/>
+                </a:solidFill>
+              </a:rPr>
+              <a:t>8 Pointer Receiver</a:t>
+            </a:r>
+            <a:endParaRPr lang="zh-TW" altLang="en-US" b="1" dirty="0">
+              <a:solidFill>
+                <a:srgbClr val="FFFF00"/>
+              </a:solidFill>
+            </a:endParaRPr>
+          </a:p>
+        </p:txBody>
+      </p:sp>
+      <p:sp>
+        <p:nvSpPr>
+          <p:cNvPr id="3" name="副標題 2"/>
+          <p:cNvSpPr>
+            <a:spLocks noGrp="1"/>
+          </p:cNvSpPr>
+          <p:nvPr>
+            <p:ph type="subTitle" idx="1"/>
+          </p:nvPr>
+        </p:nvSpPr>
+        <p:spPr>
+          <a:xfrm>
+            <a:off x="467544" y="1340769"/>
+            <a:ext cx="8352928" cy="398616"/>
+          </a:xfrm>
+          <a:ln>
+            <a:solidFill>
+              <a:srgbClr val="C00000"/>
+            </a:solidFill>
+          </a:ln>
+        </p:spPr>
+        <p:txBody>
+          <a:bodyPr>
+            <a:noAutofit/>
+          </a:bodyPr>
+          <a:lstStyle/>
+          <a:p>
+            <a:pPr marL="342900" indent="-342900" algn="l">
+              <a:buClr>
+                <a:srgbClr val="0070C0"/>
+              </a:buClr>
+              <a:buSzPct val="80000"/>
+              <a:buFont typeface="Wingdings" pitchFamily="2" charset="2"/>
+              <a:buChar char="u"/>
+            </a:pPr>
+            <a:r>
+              <a:rPr lang="en-US" altLang="zh-TW" sz="1800" dirty="0">
+                <a:solidFill>
+                  <a:schemeClr val="tx1"/>
+                </a:solidFill>
+              </a:rPr>
+              <a:t>Value Receiver (c car)</a:t>
+            </a:r>
+          </a:p>
+        </p:txBody>
+      </p:sp>
+      <p:sp>
+        <p:nvSpPr>
+          <p:cNvPr id="4" name="標題 1"/>
+          <p:cNvSpPr txBox="1">
+            <a:spLocks/>
+          </p:cNvSpPr>
+          <p:nvPr/>
+        </p:nvSpPr>
+        <p:spPr>
+          <a:xfrm>
+            <a:off x="0" y="764704"/>
+            <a:ext cx="9144000" cy="398616"/>
+          </a:xfrm>
+          <a:prstGeom prst="rect">
+            <a:avLst/>
+          </a:prstGeom>
+          <a:gradFill flip="none" rotWithShape="1">
+            <a:gsLst>
+              <a:gs pos="0">
+                <a:srgbClr val="00B0F0">
+                  <a:shade val="30000"/>
+                  <a:satMod val="115000"/>
+                </a:srgbClr>
+              </a:gs>
+              <a:gs pos="50000">
+                <a:srgbClr val="00B0F0">
+                  <a:shade val="67500"/>
+                  <a:satMod val="115000"/>
+                </a:srgbClr>
+              </a:gs>
+              <a:gs pos="100000">
+                <a:srgbClr val="00B0F0">
+                  <a:shade val="100000"/>
+                  <a:satMod val="115000"/>
+                </a:srgbClr>
+              </a:gs>
+            </a:gsLst>
+            <a:path path="circle">
+              <a:fillToRect t="100000" r="100000"/>
+            </a:path>
+            <a:tileRect l="-100000" b="-100000"/>
+          </a:gradFill>
+        </p:spPr>
+        <p:txBody>
+          <a:bodyPr vert="horz" lIns="91440" tIns="45720" rIns="91440" bIns="45720" rtlCol="0" anchor="ctr">
+            <a:normAutofit fontScale="92500"/>
+          </a:bodyPr>
+          <a:lstStyle/>
+          <a:p>
+            <a:r>
+              <a:rPr lang="en-US" altLang="zh-TW" sz="1600" b="1" i="1" dirty="0"/>
+              <a:t>ttps://www.youtube.com/watch?v=nSYFfWijl8U&amp;index=2&amp;list=PLQVvvaa0QuDeF3hP0wQoSxpkqgRcgxMqX</a:t>
+            </a:r>
+          </a:p>
+        </p:txBody>
+      </p:sp>
+      <p:sp>
+        <p:nvSpPr>
+          <p:cNvPr id="5" name="日期版面配置區 4"/>
+          <p:cNvSpPr>
+            <a:spLocks noGrp="1"/>
+          </p:cNvSpPr>
+          <p:nvPr>
+            <p:ph type="dt" sz="half" idx="10"/>
+          </p:nvPr>
+        </p:nvSpPr>
+        <p:spPr>
+          <a:xfrm>
+            <a:off x="457200" y="6356350"/>
+            <a:ext cx="2133600" cy="404246"/>
+          </a:xfrm>
+        </p:spPr>
+        <p:txBody>
+          <a:bodyPr/>
+          <a:lstStyle/>
+          <a:p>
+            <a:fld id="{A4F910E6-8D00-4BAF-8C48-9688E0B449D3}" type="datetime1">
+              <a:rPr lang="zh-TW" altLang="en-US" smtClean="0"/>
+              <a:pPr/>
+              <a:t>2018/12/13</a:t>
+            </a:fld>
+            <a:endParaRPr lang="zh-TW" altLang="en-US"/>
+          </a:p>
+        </p:txBody>
+      </p:sp>
+      <p:sp>
+        <p:nvSpPr>
+          <p:cNvPr id="6" name="投影片編號版面配置區 5"/>
+          <p:cNvSpPr>
+            <a:spLocks noGrp="1"/>
+          </p:cNvSpPr>
+          <p:nvPr>
+            <p:ph type="sldNum" sz="quarter" idx="12"/>
+          </p:nvPr>
+        </p:nvSpPr>
+        <p:spPr>
+          <a:xfrm>
+            <a:off x="6553200" y="6356350"/>
+            <a:ext cx="2133600" cy="404246"/>
+          </a:xfrm>
+        </p:spPr>
+        <p:txBody>
+          <a:bodyPr/>
+          <a:lstStyle/>
+          <a:p>
+            <a:fld id="{E4D7E63D-91F2-4366-A2C4-1B00C9E2590E}" type="slidenum">
+              <a:rPr lang="zh-TW" altLang="en-US" smtClean="0"/>
+              <a:pPr/>
+              <a:t>3</a:t>
+            </a:fld>
+            <a:endParaRPr lang="zh-TW" altLang="en-US"/>
+          </a:p>
+        </p:txBody>
+      </p:sp>
+      <p:pic>
+        <p:nvPicPr>
+          <p:cNvPr id="7" name="Picture 6">
+            <a:extLst>
+              <a:ext uri="{FF2B5EF4-FFF2-40B4-BE49-F238E27FC236}">
                 <a16:creationId xmlns:a16="http://schemas.microsoft.com/office/drawing/2014/main" id="{12CC873B-6C17-444E-913D-B1CF79B19067}"/>
               </a:ext>
             </a:extLst>
@@ -4012,7 +4353,442 @@
 </p:sld>
 </file>
 
-<file path=ppt/slides/slide3.xml><?xml version="1.0" encoding="utf-8"?>
+<file path=ppt/slides/slide4.xml><?xml version="1.0" encoding="utf-8"?>
+<p:sld xmlns:a="http://schemas.openxmlformats.org/drawingml/2006/main" xmlns:r="http://schemas.openxmlformats.org/officeDocument/2006/relationships" xmlns:p="http://schemas.openxmlformats.org/presentationml/2006/main">
+  <p:cSld>
+    <p:spTree>
+      <p:nvGrpSpPr>
+        <p:cNvPr id="1" name=""/>
+        <p:cNvGrpSpPr/>
+        <p:nvPr/>
+      </p:nvGrpSpPr>
+      <p:grpSpPr>
+        <a:xfrm>
+          <a:off x="0" y="0"/>
+          <a:ext cx="0" cy="0"/>
+          <a:chOff x="0" y="0"/>
+          <a:chExt cx="0" cy="0"/>
+        </a:xfrm>
+      </p:grpSpPr>
+      <p:pic>
+        <p:nvPicPr>
+          <p:cNvPr id="8" name="Picture 7">
+            <a:extLst>
+              <a:ext uri="{FF2B5EF4-FFF2-40B4-BE49-F238E27FC236}">
+                <a16:creationId xmlns:a16="http://schemas.microsoft.com/office/drawing/2014/main" id="{EF3BB913-027A-4F96-A6FF-8DBD8768D983}"/>
+              </a:ext>
+            </a:extLst>
+          </p:cNvPr>
+          <p:cNvPicPr>
+            <a:picLocks noChangeAspect="1"/>
+          </p:cNvPicPr>
+          <p:nvPr/>
+        </p:nvPicPr>
+        <p:blipFill>
+          <a:blip r:embed="rId2"/>
+          <a:stretch>
+            <a:fillRect/>
+          </a:stretch>
+        </p:blipFill>
+        <p:spPr>
+          <a:xfrm>
+            <a:off x="809192" y="1827686"/>
+            <a:ext cx="3830218" cy="4527644"/>
+          </a:xfrm>
+          <a:prstGeom prst="rect">
+            <a:avLst/>
+          </a:prstGeom>
+        </p:spPr>
+      </p:pic>
+      <p:pic>
+        <p:nvPicPr>
+          <p:cNvPr id="12" name="Picture 11">
+            <a:extLst>
+              <a:ext uri="{FF2B5EF4-FFF2-40B4-BE49-F238E27FC236}">
+                <a16:creationId xmlns:a16="http://schemas.microsoft.com/office/drawing/2014/main" id="{7EE05D6A-F8A4-4B4A-90F6-87C718027803}"/>
+              </a:ext>
+            </a:extLst>
+          </p:cNvPr>
+          <p:cNvPicPr>
+            <a:picLocks noChangeAspect="1"/>
+          </p:cNvPicPr>
+          <p:nvPr/>
+        </p:nvPicPr>
+        <p:blipFill>
+          <a:blip r:embed="rId3"/>
+          <a:stretch>
+            <a:fillRect/>
+          </a:stretch>
+        </p:blipFill>
+        <p:spPr>
+          <a:xfrm>
+            <a:off x="3818600" y="1997311"/>
+            <a:ext cx="5001872" cy="1168269"/>
+          </a:xfrm>
+          <a:prstGeom prst="rect">
+            <a:avLst/>
+          </a:prstGeom>
+          <a:ln>
+            <a:solidFill>
+              <a:srgbClr val="C00000"/>
+            </a:solidFill>
+          </a:ln>
+        </p:spPr>
+      </p:pic>
+      <p:sp>
+        <p:nvSpPr>
+          <p:cNvPr id="2" name="標題 1"/>
+          <p:cNvSpPr>
+            <a:spLocks noGrp="1"/>
+          </p:cNvSpPr>
+          <p:nvPr>
+            <p:ph type="ctrTitle"/>
+          </p:nvPr>
+        </p:nvSpPr>
+        <p:spPr>
+          <a:xfrm>
+            <a:off x="0" y="1"/>
+            <a:ext cx="9144000" cy="764704"/>
+          </a:xfrm>
+          <a:gradFill flip="none" rotWithShape="1">
+            <a:gsLst>
+              <a:gs pos="0">
+                <a:srgbClr val="C00000">
+                  <a:shade val="30000"/>
+                  <a:satMod val="115000"/>
+                </a:srgbClr>
+              </a:gs>
+              <a:gs pos="50000">
+                <a:srgbClr val="C00000">
+                  <a:shade val="67500"/>
+                  <a:satMod val="115000"/>
+                </a:srgbClr>
+              </a:gs>
+              <a:gs pos="100000">
+                <a:srgbClr val="C00000">
+                  <a:shade val="100000"/>
+                  <a:satMod val="115000"/>
+                </a:srgbClr>
+              </a:gs>
+            </a:gsLst>
+            <a:path path="circle">
+              <a:fillToRect t="100000" r="100000"/>
+            </a:path>
+            <a:tileRect l="-100000" b="-100000"/>
+          </a:gradFill>
+        </p:spPr>
+        <p:txBody>
+          <a:bodyPr/>
+          <a:lstStyle/>
+          <a:p>
+            <a:pPr algn="l"/>
+            <a:r>
+              <a:rPr lang="en-US" altLang="zh-TW" b="1" dirty="0">
+                <a:solidFill>
+                  <a:srgbClr val="FFFF00"/>
+                </a:solidFill>
+              </a:rPr>
+              <a:t>8 Pointer Receiver</a:t>
+            </a:r>
+            <a:endParaRPr lang="zh-TW" altLang="en-US" b="1" dirty="0">
+              <a:solidFill>
+                <a:srgbClr val="FFFF00"/>
+              </a:solidFill>
+            </a:endParaRPr>
+          </a:p>
+        </p:txBody>
+      </p:sp>
+      <p:sp>
+        <p:nvSpPr>
+          <p:cNvPr id="3" name="副標題 2"/>
+          <p:cNvSpPr>
+            <a:spLocks noGrp="1"/>
+          </p:cNvSpPr>
+          <p:nvPr>
+            <p:ph type="subTitle" idx="1"/>
+          </p:nvPr>
+        </p:nvSpPr>
+        <p:spPr>
+          <a:xfrm>
+            <a:off x="467544" y="1340769"/>
+            <a:ext cx="8352928" cy="398616"/>
+          </a:xfrm>
+          <a:ln>
+            <a:solidFill>
+              <a:srgbClr val="C00000"/>
+            </a:solidFill>
+          </a:ln>
+        </p:spPr>
+        <p:txBody>
+          <a:bodyPr>
+            <a:noAutofit/>
+          </a:bodyPr>
+          <a:lstStyle/>
+          <a:p>
+            <a:pPr marL="342900" indent="-342900" algn="l">
+              <a:buClr>
+                <a:srgbClr val="0070C0"/>
+              </a:buClr>
+              <a:buSzPct val="80000"/>
+              <a:buFont typeface="Wingdings" pitchFamily="2" charset="2"/>
+              <a:buChar char="u"/>
+            </a:pPr>
+            <a:r>
+              <a:rPr lang="en-US" altLang="zh-TW" sz="1800" dirty="0">
+                <a:solidFill>
+                  <a:schemeClr val="tx1"/>
+                </a:solidFill>
+              </a:rPr>
+              <a:t>Write a function and pass parameter to </a:t>
+            </a:r>
+            <a:r>
+              <a:rPr lang="en-US" altLang="zh-TW" sz="1800">
+                <a:solidFill>
+                  <a:schemeClr val="tx1"/>
+                </a:solidFill>
+              </a:rPr>
+              <a:t>do calculation.</a:t>
+            </a:r>
+            <a:endParaRPr lang="en-US" altLang="zh-TW" sz="1800" dirty="0">
+              <a:solidFill>
+                <a:schemeClr val="tx1"/>
+              </a:solidFill>
+            </a:endParaRPr>
+          </a:p>
+        </p:txBody>
+      </p:sp>
+      <p:sp>
+        <p:nvSpPr>
+          <p:cNvPr id="4" name="標題 1"/>
+          <p:cNvSpPr txBox="1">
+            <a:spLocks/>
+          </p:cNvSpPr>
+          <p:nvPr/>
+        </p:nvSpPr>
+        <p:spPr>
+          <a:xfrm>
+            <a:off x="0" y="764704"/>
+            <a:ext cx="9144000" cy="398616"/>
+          </a:xfrm>
+          <a:prstGeom prst="rect">
+            <a:avLst/>
+          </a:prstGeom>
+          <a:gradFill flip="none" rotWithShape="1">
+            <a:gsLst>
+              <a:gs pos="0">
+                <a:srgbClr val="00B0F0">
+                  <a:shade val="30000"/>
+                  <a:satMod val="115000"/>
+                </a:srgbClr>
+              </a:gs>
+              <a:gs pos="50000">
+                <a:srgbClr val="00B0F0">
+                  <a:shade val="67500"/>
+                  <a:satMod val="115000"/>
+                </a:srgbClr>
+              </a:gs>
+              <a:gs pos="100000">
+                <a:srgbClr val="00B0F0">
+                  <a:shade val="100000"/>
+                  <a:satMod val="115000"/>
+                </a:srgbClr>
+              </a:gs>
+            </a:gsLst>
+            <a:path path="circle">
+              <a:fillToRect t="100000" r="100000"/>
+            </a:path>
+            <a:tileRect l="-100000" b="-100000"/>
+          </a:gradFill>
+        </p:spPr>
+        <p:txBody>
+          <a:bodyPr vert="horz" lIns="91440" tIns="45720" rIns="91440" bIns="45720" rtlCol="0" anchor="ctr">
+            <a:normAutofit fontScale="92500"/>
+          </a:bodyPr>
+          <a:lstStyle/>
+          <a:p>
+            <a:r>
+              <a:rPr lang="en-US" altLang="zh-TW" sz="1600" b="1" i="1" dirty="0"/>
+              <a:t>ttps://www.youtube.com/watch?v=nSYFfWijl8U&amp;index=2&amp;list=PLQVvvaa0QuDeF3hP0wQoSxpkqgRcgxMqX</a:t>
+            </a:r>
+          </a:p>
+        </p:txBody>
+      </p:sp>
+      <p:sp>
+        <p:nvSpPr>
+          <p:cNvPr id="5" name="日期版面配置區 4"/>
+          <p:cNvSpPr>
+            <a:spLocks noGrp="1"/>
+          </p:cNvSpPr>
+          <p:nvPr>
+            <p:ph type="dt" sz="half" idx="10"/>
+          </p:nvPr>
+        </p:nvSpPr>
+        <p:spPr>
+          <a:xfrm>
+            <a:off x="457200" y="6356350"/>
+            <a:ext cx="2133600" cy="404246"/>
+          </a:xfrm>
+        </p:spPr>
+        <p:txBody>
+          <a:bodyPr/>
+          <a:lstStyle/>
+          <a:p>
+            <a:fld id="{A4F910E6-8D00-4BAF-8C48-9688E0B449D3}" type="datetime1">
+              <a:rPr lang="zh-TW" altLang="en-US" smtClean="0"/>
+              <a:pPr/>
+              <a:t>2018/12/13</a:t>
+            </a:fld>
+            <a:endParaRPr lang="zh-TW" altLang="en-US"/>
+          </a:p>
+        </p:txBody>
+      </p:sp>
+      <p:sp>
+        <p:nvSpPr>
+          <p:cNvPr id="6" name="投影片編號版面配置區 5"/>
+          <p:cNvSpPr>
+            <a:spLocks noGrp="1"/>
+          </p:cNvSpPr>
+          <p:nvPr>
+            <p:ph type="sldNum" sz="quarter" idx="12"/>
+          </p:nvPr>
+        </p:nvSpPr>
+        <p:spPr>
+          <a:xfrm>
+            <a:off x="6553200" y="6356350"/>
+            <a:ext cx="2133600" cy="404246"/>
+          </a:xfrm>
+        </p:spPr>
+        <p:txBody>
+          <a:bodyPr/>
+          <a:lstStyle/>
+          <a:p>
+            <a:fld id="{E4D7E63D-91F2-4366-A2C4-1B00C9E2590E}" type="slidenum">
+              <a:rPr lang="zh-TW" altLang="en-US" smtClean="0"/>
+              <a:pPr/>
+              <a:t>4</a:t>
+            </a:fld>
+            <a:endParaRPr lang="zh-TW" altLang="en-US"/>
+          </a:p>
+        </p:txBody>
+      </p:sp>
+      <p:sp>
+        <p:nvSpPr>
+          <p:cNvPr id="9" name="Rectangle 8">
+            <a:extLst>
+              <a:ext uri="{FF2B5EF4-FFF2-40B4-BE49-F238E27FC236}">
+                <a16:creationId xmlns:a16="http://schemas.microsoft.com/office/drawing/2014/main" id="{1D3E9405-83FB-4A0A-B2D0-8CDA03082D1D}"/>
+              </a:ext>
+            </a:extLst>
+          </p:cNvPr>
+          <p:cNvSpPr/>
+          <p:nvPr/>
+        </p:nvSpPr>
+        <p:spPr>
+          <a:xfrm>
+            <a:off x="3818600" y="2650182"/>
+            <a:ext cx="1172802" cy="274761"/>
+          </a:xfrm>
+          <a:prstGeom prst="rect">
+            <a:avLst/>
+          </a:prstGeom>
+          <a:noFill/>
+          <a:ln>
+            <a:solidFill>
+              <a:srgbClr val="C00000"/>
+            </a:solidFill>
+          </a:ln>
+        </p:spPr>
+        <p:style>
+          <a:lnRef idx="2">
+            <a:schemeClr val="accent1">
+              <a:shade val="50000"/>
+            </a:schemeClr>
+          </a:lnRef>
+          <a:fillRef idx="1">
+            <a:schemeClr val="accent1"/>
+          </a:fillRef>
+          <a:effectRef idx="0">
+            <a:schemeClr val="accent1"/>
+          </a:effectRef>
+          <a:fontRef idx="minor">
+            <a:schemeClr val="lt1"/>
+          </a:fontRef>
+        </p:style>
+        <p:txBody>
+          <a:bodyPr rtlCol="0" anchor="ctr"/>
+          <a:lstStyle/>
+          <a:p>
+            <a:pPr algn="ctr"/>
+            <a:endParaRPr lang="en-US"/>
+          </a:p>
+        </p:txBody>
+      </p:sp>
+      <p:sp>
+        <p:nvSpPr>
+          <p:cNvPr id="11" name="Rectangle 10">
+            <a:extLst>
+              <a:ext uri="{FF2B5EF4-FFF2-40B4-BE49-F238E27FC236}">
+                <a16:creationId xmlns:a16="http://schemas.microsoft.com/office/drawing/2014/main" id="{7DF9A076-1DC2-4DAB-A543-391162C6C597}"/>
+              </a:ext>
+            </a:extLst>
+          </p:cNvPr>
+          <p:cNvSpPr/>
+          <p:nvPr/>
+        </p:nvSpPr>
+        <p:spPr>
+          <a:xfrm>
+            <a:off x="1259632" y="5877272"/>
+            <a:ext cx="1683160" cy="404246"/>
+          </a:xfrm>
+          <a:prstGeom prst="rect">
+            <a:avLst/>
+          </a:prstGeom>
+          <a:noFill/>
+          <a:ln>
+            <a:solidFill>
+              <a:srgbClr val="C00000"/>
+            </a:solidFill>
+          </a:ln>
+        </p:spPr>
+        <p:style>
+          <a:lnRef idx="2">
+            <a:schemeClr val="accent1">
+              <a:shade val="50000"/>
+            </a:schemeClr>
+          </a:lnRef>
+          <a:fillRef idx="1">
+            <a:schemeClr val="accent1"/>
+          </a:fillRef>
+          <a:effectRef idx="0">
+            <a:schemeClr val="accent1"/>
+          </a:effectRef>
+          <a:fontRef idx="minor">
+            <a:schemeClr val="lt1"/>
+          </a:fontRef>
+        </p:style>
+        <p:txBody>
+          <a:bodyPr rtlCol="0" anchor="ctr"/>
+          <a:lstStyle/>
+          <a:p>
+            <a:pPr algn="ctr"/>
+            <a:endParaRPr lang="en-US"/>
+          </a:p>
+        </p:txBody>
+      </p:sp>
+    </p:spTree>
+    <p:extLst>
+      <p:ext uri="{BB962C8B-B14F-4D97-AF65-F5344CB8AC3E}">
+        <p14:creationId xmlns:p14="http://schemas.microsoft.com/office/powerpoint/2010/main" val="2504109346"/>
+      </p:ext>
+    </p:extLst>
+  </p:cSld>
+  <p:clrMapOvr>
+    <a:masterClrMapping/>
+  </p:clrMapOvr>
+</p:sld>
+</file>
+
+<file path=ppt/slides/slide5.xml><?xml version="1.0" encoding="utf-8"?>
 <p:sld xmlns:a="http://schemas.openxmlformats.org/drawingml/2006/main" xmlns:r="http://schemas.openxmlformats.org/officeDocument/2006/relationships" xmlns:p="http://schemas.openxmlformats.org/presentationml/2006/main">
   <p:cSld>
     <p:spTree>
@@ -4316,7 +5092,7 @@
             <a:fld id="{E4D7E63D-91F2-4366-A2C4-1B00C9E2590E}" type="slidenum">
               <a:rPr lang="zh-TW" altLang="en-US" smtClean="0"/>
               <a:pPr/>
-              <a:t>3</a:t>
+              <a:t>5</a:t>
             </a:fld>
             <a:endParaRPr lang="zh-TW" altLang="en-US"/>
           </a:p>
@@ -4429,7 +5205,7 @@
     </p:spTree>
     <p:extLst>
       <p:ext uri="{BB962C8B-B14F-4D97-AF65-F5344CB8AC3E}">
-        <p14:creationId xmlns:p14="http://schemas.microsoft.com/office/powerpoint/2010/main" val="2504109346"/>
+        <p14:creationId xmlns:p14="http://schemas.microsoft.com/office/powerpoint/2010/main" val="1910539617"/>
       </p:ext>
     </p:extLst>
   </p:cSld>
@@ -4439,7 +5215,7 @@
 </p:sld>
 </file>
 
-<file path=ppt/slides/slide4.xml><?xml version="1.0" encoding="utf-8"?>
+<file path=ppt/slides/slide6.xml><?xml version="1.0" encoding="utf-8"?>
 <p:sld xmlns:a="http://schemas.openxmlformats.org/drawingml/2006/main" xmlns:r="http://schemas.openxmlformats.org/officeDocument/2006/relationships" xmlns:p="http://schemas.openxmlformats.org/presentationml/2006/main">
   <p:cSld>
     <p:spTree>
@@ -4468,119 +5244,9 @@
         </p:nvSpPr>
         <p:spPr>
           <a:xfrm>
-            <a:off x="0" y="1"/>
-            <a:ext cx="9144000" cy="764704"/>
-          </a:xfrm>
-          <a:gradFill flip="none" rotWithShape="1">
-            <a:gsLst>
-              <a:gs pos="0">
-                <a:srgbClr val="C00000">
-                  <a:shade val="30000"/>
-                  <a:satMod val="115000"/>
-                </a:srgbClr>
-              </a:gs>
-              <a:gs pos="50000">
-                <a:srgbClr val="C00000">
-                  <a:shade val="67500"/>
-                  <a:satMod val="115000"/>
-                </a:srgbClr>
-              </a:gs>
-              <a:gs pos="100000">
-                <a:srgbClr val="C00000">
-                  <a:shade val="100000"/>
-                  <a:satMod val="115000"/>
-                </a:srgbClr>
-              </a:gs>
-            </a:gsLst>
-            <a:path path="circle">
-              <a:fillToRect t="100000" r="100000"/>
-            </a:path>
-            <a:tileRect l="-100000" b="-100000"/>
-          </a:gradFill>
-        </p:spPr>
-        <p:txBody>
-          <a:bodyPr/>
-          <a:lstStyle/>
-          <a:p>
-            <a:pPr algn="l"/>
-            <a:r>
-              <a:rPr lang="en-US" altLang="zh-TW" b="1" dirty="0">
-                <a:solidFill>
-                  <a:srgbClr val="FFFF00"/>
-                </a:solidFill>
-              </a:rPr>
-              <a:t>8 Pointer Receiver</a:t>
-            </a:r>
-            <a:endParaRPr lang="zh-TW" altLang="en-US" b="1" dirty="0">
-              <a:solidFill>
-                <a:srgbClr val="FFFF00"/>
-              </a:solidFill>
-            </a:endParaRPr>
-          </a:p>
-        </p:txBody>
-      </p:sp>
-      <p:sp>
-        <p:nvSpPr>
-          <p:cNvPr id="3" name="副標題 2"/>
-          <p:cNvSpPr>
-            <a:spLocks noGrp="1"/>
-          </p:cNvSpPr>
-          <p:nvPr>
-            <p:ph type="subTitle" idx="1"/>
-          </p:nvPr>
-        </p:nvSpPr>
-        <p:spPr>
-          <a:xfrm>
-            <a:off x="467544" y="1340769"/>
-            <a:ext cx="8352928" cy="398616"/>
-          </a:xfrm>
-          <a:ln>
-            <a:solidFill>
-              <a:srgbClr val="C00000"/>
-            </a:solidFill>
-          </a:ln>
-        </p:spPr>
-        <p:txBody>
-          <a:bodyPr>
-            <a:noAutofit/>
-          </a:bodyPr>
-          <a:lstStyle/>
-          <a:p>
-            <a:pPr marL="342900" indent="-342900" algn="l">
-              <a:buClr>
-                <a:srgbClr val="0070C0"/>
-              </a:buClr>
-              <a:buSzPct val="80000"/>
-              <a:buFont typeface="Wingdings" pitchFamily="2" charset="2"/>
-              <a:buChar char="u"/>
-            </a:pPr>
-            <a:r>
-              <a:rPr lang="en-US" altLang="zh-TW" sz="1800" dirty="0">
-                <a:solidFill>
-                  <a:schemeClr val="tx1"/>
-                </a:solidFill>
-              </a:rPr>
-              <a:t>Go to: https://golang.org/doc/faq#Pointers</a:t>
-            </a:r>
-          </a:p>
-        </p:txBody>
-      </p:sp>
-      <p:sp>
-        <p:nvSpPr>
-          <p:cNvPr id="4" name="標題 1"/>
-          <p:cNvSpPr txBox="1">
-            <a:spLocks/>
-          </p:cNvSpPr>
-          <p:nvPr/>
-        </p:nvSpPr>
-        <p:spPr>
-          <a:xfrm>
-            <a:off x="0" y="764704"/>
-            <a:ext cx="9144000" cy="398616"/>
-          </a:xfrm>
-          <a:prstGeom prst="rect">
-            <a:avLst/>
-          </a:prstGeom>
+            <a:off x="0" y="2130425"/>
+            <a:ext cx="9144000" cy="1470025"/>
+          </a:xfrm>
           <a:gradFill flip="none" rotWithShape="1">
             <a:gsLst>
               <a:gs pos="0">
@@ -4609,236 +5275,6 @@
           </a:gradFill>
         </p:spPr>
         <p:txBody>
-          <a:bodyPr vert="horz" lIns="91440" tIns="45720" rIns="91440" bIns="45720" rtlCol="0" anchor="ctr">
-            <a:normAutofit fontScale="92500"/>
-          </a:bodyPr>
-          <a:lstStyle/>
-          <a:p>
-            <a:r>
-              <a:rPr lang="en-US" altLang="zh-TW" sz="1600" b="1" i="1" dirty="0"/>
-              <a:t>ttps://www.youtube.com/watch?v=nSYFfWijl8U&amp;index=2&amp;list=PLQVvvaa0QuDeF3hP0wQoSxpkqgRcgxMqX</a:t>
-            </a:r>
-          </a:p>
-        </p:txBody>
-      </p:sp>
-      <p:sp>
-        <p:nvSpPr>
-          <p:cNvPr id="5" name="日期版面配置區 4"/>
-          <p:cNvSpPr>
-            <a:spLocks noGrp="1"/>
-          </p:cNvSpPr>
-          <p:nvPr>
-            <p:ph type="dt" sz="half" idx="10"/>
-          </p:nvPr>
-        </p:nvSpPr>
-        <p:spPr>
-          <a:xfrm>
-            <a:off x="457200" y="6356350"/>
-            <a:ext cx="2133600" cy="404246"/>
-          </a:xfrm>
-        </p:spPr>
-        <p:txBody>
-          <a:bodyPr/>
-          <a:lstStyle/>
-          <a:p>
-            <a:fld id="{A4F910E6-8D00-4BAF-8C48-9688E0B449D3}" type="datetime1">
-              <a:rPr lang="zh-TW" altLang="en-US" smtClean="0"/>
-              <a:pPr/>
-              <a:t>2018/12/13</a:t>
-            </a:fld>
-            <a:endParaRPr lang="zh-TW" altLang="en-US"/>
-          </a:p>
-        </p:txBody>
-      </p:sp>
-      <p:sp>
-        <p:nvSpPr>
-          <p:cNvPr id="6" name="投影片編號版面配置區 5"/>
-          <p:cNvSpPr>
-            <a:spLocks noGrp="1"/>
-          </p:cNvSpPr>
-          <p:nvPr>
-            <p:ph type="sldNum" sz="quarter" idx="12"/>
-          </p:nvPr>
-        </p:nvSpPr>
-        <p:spPr>
-          <a:xfrm>
-            <a:off x="6553200" y="6356350"/>
-            <a:ext cx="2133600" cy="404246"/>
-          </a:xfrm>
-        </p:spPr>
-        <p:txBody>
-          <a:bodyPr/>
-          <a:lstStyle/>
-          <a:p>
-            <a:fld id="{E4D7E63D-91F2-4366-A2C4-1B00C9E2590E}" type="slidenum">
-              <a:rPr lang="zh-TW" altLang="en-US" smtClean="0"/>
-              <a:pPr/>
-              <a:t>4</a:t>
-            </a:fld>
-            <a:endParaRPr lang="zh-TW" altLang="en-US"/>
-          </a:p>
-        </p:txBody>
-      </p:sp>
-      <p:pic>
-        <p:nvPicPr>
-          <p:cNvPr id="7" name="Picture 6">
-            <a:extLst>
-              <a:ext uri="{FF2B5EF4-FFF2-40B4-BE49-F238E27FC236}">
-                <a16:creationId xmlns:a16="http://schemas.microsoft.com/office/drawing/2014/main" id="{57ED30F3-48A3-4144-A4BD-51DBD137886C}"/>
-              </a:ext>
-            </a:extLst>
-          </p:cNvPr>
-          <p:cNvPicPr>
-            <a:picLocks noChangeAspect="1"/>
-          </p:cNvPicPr>
-          <p:nvPr/>
-        </p:nvPicPr>
-        <p:blipFill>
-          <a:blip r:embed="rId2"/>
-          <a:stretch>
-            <a:fillRect/>
-          </a:stretch>
-        </p:blipFill>
-        <p:spPr>
-          <a:xfrm>
-            <a:off x="1547664" y="1916834"/>
-            <a:ext cx="5745407" cy="4512915"/>
-          </a:xfrm>
-          <a:prstGeom prst="rect">
-            <a:avLst/>
-          </a:prstGeom>
-          <a:ln>
-            <a:solidFill>
-              <a:srgbClr val="C00000"/>
-            </a:solidFill>
-          </a:ln>
-        </p:spPr>
-      </p:pic>
-      <p:sp>
-        <p:nvSpPr>
-          <p:cNvPr id="8" name="Rectangle 7">
-            <a:extLst>
-              <a:ext uri="{FF2B5EF4-FFF2-40B4-BE49-F238E27FC236}">
-                <a16:creationId xmlns:a16="http://schemas.microsoft.com/office/drawing/2014/main" id="{C6CCAA14-8B49-47E0-9404-C6E0F971FD69}"/>
-              </a:ext>
-            </a:extLst>
-          </p:cNvPr>
-          <p:cNvSpPr/>
-          <p:nvPr/>
-        </p:nvSpPr>
-        <p:spPr>
-          <a:xfrm>
-            <a:off x="1691680" y="5229200"/>
-            <a:ext cx="5112568" cy="373636"/>
-          </a:xfrm>
-          <a:prstGeom prst="rect">
-            <a:avLst/>
-          </a:prstGeom>
-          <a:noFill/>
-          <a:ln>
-            <a:solidFill>
-              <a:srgbClr val="C00000"/>
-            </a:solidFill>
-          </a:ln>
-        </p:spPr>
-        <p:style>
-          <a:lnRef idx="2">
-            <a:schemeClr val="accent1">
-              <a:shade val="50000"/>
-            </a:schemeClr>
-          </a:lnRef>
-          <a:fillRef idx="1">
-            <a:schemeClr val="accent1"/>
-          </a:fillRef>
-          <a:effectRef idx="0">
-            <a:schemeClr val="accent1"/>
-          </a:effectRef>
-          <a:fontRef idx="minor">
-            <a:schemeClr val="lt1"/>
-          </a:fontRef>
-        </p:style>
-        <p:txBody>
-          <a:bodyPr rtlCol="0" anchor="ctr"/>
-          <a:lstStyle/>
-          <a:p>
-            <a:pPr algn="ctr"/>
-            <a:endParaRPr lang="en-US"/>
-          </a:p>
-        </p:txBody>
-      </p:sp>
-    </p:spTree>
-    <p:extLst>
-      <p:ext uri="{BB962C8B-B14F-4D97-AF65-F5344CB8AC3E}">
-        <p14:creationId xmlns:p14="http://schemas.microsoft.com/office/powerpoint/2010/main" val="1316084119"/>
-      </p:ext>
-    </p:extLst>
-  </p:cSld>
-  <p:clrMapOvr>
-    <a:masterClrMapping/>
-  </p:clrMapOvr>
-</p:sld>
-</file>
-
-<file path=ppt/slides/slide5.xml><?xml version="1.0" encoding="utf-8"?>
-<p:sld xmlns:a="http://schemas.openxmlformats.org/drawingml/2006/main" xmlns:r="http://schemas.openxmlformats.org/officeDocument/2006/relationships" xmlns:p="http://schemas.openxmlformats.org/presentationml/2006/main">
-  <p:cSld>
-    <p:spTree>
-      <p:nvGrpSpPr>
-        <p:cNvPr id="1" name=""/>
-        <p:cNvGrpSpPr/>
-        <p:nvPr/>
-      </p:nvGrpSpPr>
-      <p:grpSpPr>
-        <a:xfrm>
-          <a:off x="0" y="0"/>
-          <a:ext cx="0" cy="0"/>
-          <a:chOff x="0" y="0"/>
-          <a:chExt cx="0" cy="0"/>
-        </a:xfrm>
-      </p:grpSpPr>
-      <p:sp>
-        <p:nvSpPr>
-          <p:cNvPr id="2" name="標題 1"/>
-          <p:cNvSpPr>
-            <a:spLocks noGrp="1"/>
-          </p:cNvSpPr>
-          <p:nvPr>
-            <p:ph type="ctrTitle"/>
-          </p:nvPr>
-        </p:nvSpPr>
-        <p:spPr>
-          <a:xfrm>
-            <a:off x="0" y="2130425"/>
-            <a:ext cx="9144000" cy="1470025"/>
-          </a:xfrm>
-          <a:gradFill flip="none" rotWithShape="1">
-            <a:gsLst>
-              <a:gs pos="0">
-                <a:srgbClr val="00B0F0">
-                  <a:shade val="30000"/>
-                  <a:satMod val="115000"/>
-                </a:srgbClr>
-              </a:gs>
-              <a:gs pos="50000">
-                <a:srgbClr val="00B0F0">
-                  <a:shade val="67500"/>
-                  <a:satMod val="115000"/>
-                </a:srgbClr>
-              </a:gs>
-              <a:gs pos="100000">
-                <a:srgbClr val="00B0F0">
-                  <a:shade val="100000"/>
-                  <a:satMod val="115000"/>
-                </a:srgbClr>
-              </a:gs>
-            </a:gsLst>
-            <a:path path="circle">
-              <a:fillToRect t="100000" r="100000"/>
-            </a:path>
-            <a:tileRect l="-100000" b="-100000"/>
-          </a:gradFill>
-        </p:spPr>
-        <p:txBody>
           <a:bodyPr>
             <a:normAutofit/>
           </a:bodyPr>
@@ -4902,7 +5338,7 @@
             <a:fld id="{E4D7E63D-91F2-4366-A2C4-1B00C9E2590E}" type="slidenum">
               <a:rPr lang="zh-TW" altLang="en-US" smtClean="0"/>
               <a:pPr/>
-              <a:t>5</a:t>
+              <a:t>6</a:t>
             </a:fld>
             <a:endParaRPr lang="zh-TW" altLang="en-US"/>
           </a:p>

</xml_diff>